<commit_message>
finished presentation - this time for real
</commit_message>
<xml_diff>
--- a/Documentation/Abschlusspräsentation.pptx
+++ b/Documentation/Abschlusspräsentation.pptx
@@ -20,7 +20,8 @@
     <p:sldId id="268" r:id="rId14"/>
     <p:sldId id="269" r:id="rId15"/>
     <p:sldId id="270" r:id="rId16"/>
-    <p:sldId id="271" r:id="rId17"/>
+    <p:sldId id="274" r:id="rId17"/>
+    <p:sldId id="271" r:id="rId18"/>
   </p:sldIdLst>
   <p:sldSz cx="12192000" cy="6858000"/>
   <p:notesSz cx="6858000" cy="9144000"/>
@@ -2315,7 +2316,7 @@
             <a:fld id="{A5B0A250-5CC0-1746-B209-08E8B0DAE6AF}" type="datetimeFigureOut">
               <a:rPr lang="en-US" smtClean="0"/>
               <a:pPr algn="l"/>
-              <a:t>4/24/2023</a:t>
+              <a:t>4/26/2023</a:t>
             </a:fld>
             <a:endParaRPr lang="en-US" dirty="0"/>
           </a:p>
@@ -3777,7 +3778,7 @@
           <a:p>
             <a:fld id="{A5B0A250-5CC0-1746-B209-08E8B0DAE6AF}" type="datetimeFigureOut">
               <a:rPr lang="en-US" smtClean="0"/>
-              <a:t>4/24/2023</a:t>
+              <a:t>4/26/2023</a:t>
             </a:fld>
             <a:endParaRPr lang="en-US" dirty="0"/>
           </a:p>
@@ -4707,7 +4708,7 @@
           <a:p>
             <a:fld id="{A5B0A250-5CC0-1746-B209-08E8B0DAE6AF}" type="datetimeFigureOut">
               <a:rPr lang="en-US" smtClean="0"/>
-              <a:t>4/24/2023</a:t>
+              <a:t>4/26/2023</a:t>
             </a:fld>
             <a:endParaRPr lang="en-US"/>
           </a:p>
@@ -6164,7 +6165,7 @@
           <a:p>
             <a:fld id="{A5B0A250-5CC0-1746-B209-08E8B0DAE6AF}" type="datetimeFigureOut">
               <a:rPr lang="en-US" smtClean="0"/>
-              <a:t>4/24/2023</a:t>
+              <a:t>4/26/2023</a:t>
             </a:fld>
             <a:endParaRPr lang="en-US" dirty="0"/>
           </a:p>
@@ -8520,7 +8521,7 @@
           <a:p>
             <a:fld id="{A5B0A250-5CC0-1746-B209-08E8B0DAE6AF}" type="datetimeFigureOut">
               <a:rPr lang="en-US" smtClean="0"/>
-              <a:t>4/24/2023</a:t>
+              <a:t>4/26/2023</a:t>
             </a:fld>
             <a:endParaRPr lang="en-US" dirty="0"/>
           </a:p>
@@ -9561,7 +9562,7 @@
           <a:p>
             <a:fld id="{A5B0A250-5CC0-1746-B209-08E8B0DAE6AF}" type="datetimeFigureOut">
               <a:rPr lang="en-US" smtClean="0"/>
-              <a:t>4/24/2023</a:t>
+              <a:t>4/26/2023</a:t>
             </a:fld>
             <a:endParaRPr lang="en-US" dirty="0"/>
           </a:p>
@@ -10774,7 +10775,7 @@
           <a:p>
             <a:fld id="{A5B0A250-5CC0-1746-B209-08E8B0DAE6AF}" type="datetimeFigureOut">
               <a:rPr lang="en-US" smtClean="0"/>
-              <a:t>4/24/2023</a:t>
+              <a:t>4/26/2023</a:t>
             </a:fld>
             <a:endParaRPr lang="en-US" dirty="0"/>
           </a:p>
@@ -11683,7 +11684,7 @@
           <a:p>
             <a:fld id="{A5B0A250-5CC0-1746-B209-08E8B0DAE6AF}" type="datetimeFigureOut">
               <a:rPr lang="en-US" smtClean="0"/>
-              <a:t>4/24/2023</a:t>
+              <a:t>4/26/2023</a:t>
             </a:fld>
             <a:endParaRPr lang="en-US" dirty="0"/>
           </a:p>
@@ -11842,7 +11843,7 @@
             <a:fld id="{A5B0A250-5CC0-1746-B209-08E8B0DAE6AF}" type="datetimeFigureOut">
               <a:rPr lang="en-US" smtClean="0"/>
               <a:pPr/>
-              <a:t>4/24/2023</a:t>
+              <a:t>4/26/2023</a:t>
             </a:fld>
             <a:endParaRPr lang="en-US" dirty="0"/>
           </a:p>
@@ -12825,7 +12826,7 @@
           <a:p>
             <a:fld id="{A5B0A250-5CC0-1746-B209-08E8B0DAE6AF}" type="datetimeFigureOut">
               <a:rPr lang="en-US" smtClean="0"/>
-              <a:t>4/24/2023</a:t>
+              <a:t>4/26/2023</a:t>
             </a:fld>
             <a:endParaRPr lang="en-US" dirty="0"/>
           </a:p>
@@ -13887,7 +13888,7 @@
           <a:p>
             <a:fld id="{A5B0A250-5CC0-1746-B209-08E8B0DAE6AF}" type="datetimeFigureOut">
               <a:rPr lang="en-US" smtClean="0"/>
-              <a:t>4/24/2023</a:t>
+              <a:t>4/26/2023</a:t>
             </a:fld>
             <a:endParaRPr lang="en-US" dirty="0"/>
           </a:p>
@@ -14175,7 +14176,7 @@
             <a:fld id="{A5B0A250-5CC0-1746-B209-08E8B0DAE6AF}" type="datetimeFigureOut">
               <a:rPr lang="en-US" smtClean="0"/>
               <a:pPr/>
-              <a:t>4/24/2023</a:t>
+              <a:t>4/26/2023</a:t>
             </a:fld>
             <a:endParaRPr lang="en-US" dirty="0"/>
           </a:p>
@@ -16868,6 +16869,243 @@
           <a:chExt cx="0" cy="0"/>
         </a:xfrm>
       </p:grpSpPr>
+      <p:sp>
+        <p:nvSpPr>
+          <p:cNvPr id="2" name="Titel 1">
+            <a:extLst>
+              <a:ext uri="{FF2B5EF4-FFF2-40B4-BE49-F238E27FC236}">
+                <a16:creationId xmlns:a16="http://schemas.microsoft.com/office/drawing/2014/main" id="{A33CB60F-1CBE-0BB3-3A33-B7A9B7B93E84}"/>
+              </a:ext>
+            </a:extLst>
+          </p:cNvPr>
+          <p:cNvSpPr>
+            <a:spLocks noGrp="1"/>
+          </p:cNvSpPr>
+          <p:nvPr>
+            <p:ph type="title"/>
+          </p:nvPr>
+        </p:nvSpPr>
+        <p:spPr/>
+        <p:txBody>
+          <a:bodyPr/>
+          <a:lstStyle/>
+          <a:p>
+            <a:r>
+              <a:rPr lang="de-DE" dirty="0"/>
+              <a:t>.exe</a:t>
+            </a:r>
+          </a:p>
+        </p:txBody>
+      </p:sp>
+      <p:sp>
+        <p:nvSpPr>
+          <p:cNvPr id="3" name="Inhaltsplatzhalter 2">
+            <a:extLst>
+              <a:ext uri="{FF2B5EF4-FFF2-40B4-BE49-F238E27FC236}">
+                <a16:creationId xmlns:a16="http://schemas.microsoft.com/office/drawing/2014/main" id="{F1750177-DD7A-5FE9-6C4B-0BC61CB637A5}"/>
+              </a:ext>
+            </a:extLst>
+          </p:cNvPr>
+          <p:cNvSpPr>
+            <a:spLocks noGrp="1"/>
+          </p:cNvSpPr>
+          <p:nvPr>
+            <p:ph idx="1"/>
+          </p:nvPr>
+        </p:nvSpPr>
+        <p:spPr/>
+        <p:txBody>
+          <a:bodyPr/>
+          <a:lstStyle/>
+          <a:p>
+            <a:r>
+              <a:rPr lang="de-DE" dirty="0" err="1"/>
+              <a:t>pip</a:t>
+            </a:r>
+            <a:r>
+              <a:rPr lang="de-DE" dirty="0"/>
+              <a:t> </a:t>
+            </a:r>
+            <a:r>
+              <a:rPr lang="de-DE" dirty="0" err="1"/>
+              <a:t>install</a:t>
+            </a:r>
+            <a:r>
+              <a:rPr lang="de-DE" dirty="0"/>
+              <a:t> auto-</a:t>
+            </a:r>
+            <a:r>
+              <a:rPr lang="de-DE" dirty="0" err="1"/>
+              <a:t>py</a:t>
+            </a:r>
+            <a:r>
+              <a:rPr lang="de-DE" dirty="0"/>
+              <a:t>-</a:t>
+            </a:r>
+            <a:r>
+              <a:rPr lang="de-DE" dirty="0" err="1"/>
+              <a:t>to</a:t>
+            </a:r>
+            <a:r>
+              <a:rPr lang="de-DE" dirty="0"/>
+              <a:t>-exe</a:t>
+            </a:r>
+          </a:p>
+          <a:p>
+            <a:r>
+              <a:rPr lang="de-DE" dirty="0"/>
+              <a:t>auto-</a:t>
+            </a:r>
+            <a:r>
+              <a:rPr lang="de-DE" dirty="0" err="1"/>
+              <a:t>py</a:t>
+            </a:r>
+            <a:r>
+              <a:rPr lang="de-DE" dirty="0"/>
+              <a:t>-</a:t>
+            </a:r>
+            <a:r>
+              <a:rPr lang="de-DE" dirty="0" err="1"/>
+              <a:t>to</a:t>
+            </a:r>
+            <a:r>
+              <a:rPr lang="de-DE" dirty="0"/>
+              <a:t>-exe</a:t>
+            </a:r>
+          </a:p>
+        </p:txBody>
+      </p:sp>
+      <p:sp>
+        <p:nvSpPr>
+          <p:cNvPr id="4" name="Rechteck 3">
+            <a:extLst>
+              <a:ext uri="{FF2B5EF4-FFF2-40B4-BE49-F238E27FC236}">
+                <a16:creationId xmlns:a16="http://schemas.microsoft.com/office/drawing/2014/main" id="{4F92617B-7013-DA91-250B-38C443687C86}"/>
+              </a:ext>
+            </a:extLst>
+          </p:cNvPr>
+          <p:cNvSpPr/>
+          <p:nvPr/>
+        </p:nvSpPr>
+        <p:spPr>
+          <a:xfrm>
+            <a:off x="434340" y="6015990"/>
+            <a:ext cx="8294370" cy="191262"/>
+          </a:xfrm>
+          <a:prstGeom prst="rect">
+            <a:avLst/>
+          </a:prstGeom>
+          <a:solidFill>
+            <a:schemeClr val="bg1"/>
+          </a:solidFill>
+          <a:ln>
+            <a:solidFill>
+              <a:schemeClr val="bg1"/>
+            </a:solidFill>
+          </a:ln>
+        </p:spPr>
+        <p:style>
+          <a:lnRef idx="2">
+            <a:schemeClr val="accent1">
+              <a:shade val="50000"/>
+            </a:schemeClr>
+          </a:lnRef>
+          <a:fillRef idx="1">
+            <a:schemeClr val="accent1"/>
+          </a:fillRef>
+          <a:effectRef idx="0">
+            <a:schemeClr val="accent1"/>
+          </a:effectRef>
+          <a:fontRef idx="minor">
+            <a:schemeClr val="lt1"/>
+          </a:fontRef>
+        </p:style>
+        <p:txBody>
+          <a:bodyPr rtlCol="0" anchor="ctr"/>
+          <a:lstStyle/>
+          <a:p>
+            <a:pPr algn="ctr"/>
+            <a:endParaRPr lang="de-DE"/>
+          </a:p>
+        </p:txBody>
+      </p:sp>
+      <p:pic>
+        <p:nvPicPr>
+          <p:cNvPr id="1026" name="Picture 2" descr="Bild">
+            <a:extLst>
+              <a:ext uri="{FF2B5EF4-FFF2-40B4-BE49-F238E27FC236}">
+                <a16:creationId xmlns:a16="http://schemas.microsoft.com/office/drawing/2014/main" id="{EF46D65F-46F2-B737-DFE6-CEF8C2CE9345}"/>
+              </a:ext>
+            </a:extLst>
+          </p:cNvPr>
+          <p:cNvPicPr>
+            <a:picLocks noChangeAspect="1" noChangeArrowheads="1"/>
+          </p:cNvPicPr>
+          <p:nvPr/>
+        </p:nvPicPr>
+        <p:blipFill>
+          <a:blip r:embed="rId2">
+            <a:extLst>
+              <a:ext uri="{28A0092B-C50C-407E-A947-70E740481C1C}">
+                <a14:useLocalDpi xmlns:a14="http://schemas.microsoft.com/office/drawing/2010/main" val="0"/>
+              </a:ext>
+            </a:extLst>
+          </a:blip>
+          <a:srcRect/>
+          <a:stretch>
+            <a:fillRect/>
+          </a:stretch>
+        </p:blipFill>
+        <p:spPr bwMode="auto">
+          <a:xfrm>
+            <a:off x="4963479" y="681990"/>
+            <a:ext cx="5171148" cy="5405120"/>
+          </a:xfrm>
+          <a:prstGeom prst="rect">
+            <a:avLst/>
+          </a:prstGeom>
+          <a:noFill/>
+          <a:extLst>
+            <a:ext uri="{909E8E84-426E-40DD-AFC4-6F175D3DCCD1}">
+              <a14:hiddenFill xmlns:a14="http://schemas.microsoft.com/office/drawing/2010/main">
+                <a:solidFill>
+                  <a:srgbClr val="FFFFFF"/>
+                </a:solidFill>
+              </a14:hiddenFill>
+            </a:ext>
+          </a:extLst>
+        </p:spPr>
+      </p:pic>
+    </p:spTree>
+    <p:extLst>
+      <p:ext uri="{BB962C8B-B14F-4D97-AF65-F5344CB8AC3E}">
+        <p14:creationId xmlns:p14="http://schemas.microsoft.com/office/powerpoint/2010/main" val="3884952526"/>
+      </p:ext>
+    </p:extLst>
+  </p:cSld>
+  <p:clrMapOvr>
+    <a:masterClrMapping/>
+  </p:clrMapOvr>
+</p:sld>
+</file>
+
+<file path=ppt/slides/slide17.xml><?xml version="1.0" encoding="utf-8"?>
+<p:sld xmlns:a="http://schemas.openxmlformats.org/drawingml/2006/main" xmlns:r="http://schemas.openxmlformats.org/officeDocument/2006/relationships" xmlns:p="http://schemas.openxmlformats.org/presentationml/2006/main">
+  <p:cSld>
+    <p:spTree>
+      <p:nvGrpSpPr>
+        <p:cNvPr id="1" name=""/>
+        <p:cNvGrpSpPr/>
+        <p:nvPr/>
+      </p:nvGrpSpPr>
+      <p:grpSpPr>
+        <a:xfrm>
+          <a:off x="0" y="0"/>
+          <a:ext cx="0" cy="0"/>
+          <a:chOff x="0" y="0"/>
+          <a:chExt cx="0" cy="0"/>
+        </a:xfrm>
+      </p:grpSpPr>
       <p:pic>
         <p:nvPicPr>
           <p:cNvPr id="5" name="Grafik 4">
@@ -16977,7 +17215,9 @@
         </p:nvSpPr>
         <p:spPr/>
         <p:txBody>
-          <a:bodyPr/>
+          <a:bodyPr>
+            <a:normAutofit lnSpcReduction="10000"/>
+          </a:bodyPr>
           <a:lstStyle/>
           <a:p>
             <a:r>
@@ -17031,6 +17271,15 @@
                 <a:cs typeface="Calibri" panose="020F0502020204030204" pitchFamily="34" charset="0"/>
               </a:rPr>
               <a:t>Zusatzfunktionen</a:t>
+            </a:r>
+          </a:p>
+          <a:p>
+            <a:r>
+              <a:rPr lang="de-DE" dirty="0">
+                <a:latin typeface="Calibri" panose="020F0502020204030204" pitchFamily="34" charset="0"/>
+                <a:cs typeface="Calibri" panose="020F0502020204030204" pitchFamily="34" charset="0"/>
+              </a:rPr>
+              <a:t>.exe</a:t>
             </a:r>
           </a:p>
           <a:p>

</xml_diff>